<commit_message>
Button noise when button is clicked/confirmed
Also addded my contributions to Production Outcomes
</commit_message>
<xml_diff>
--- a/Documents/Weekly Production Logs/Fireball - Production Outcomes.pptx
+++ b/Documents/Weekly Production Logs/Fireball - Production Outcomes.pptx
@@ -8164,7 +8164,7 @@
             <p:ph idx="1"/>
             <p:extLst>
               <p:ext uri="{D42A27DB-BD31-4B8C-83A1-F6EECF244321}">
-                <p14:modId xmlns:p14="http://schemas.microsoft.com/office/powerpoint/2010/main" val="835536682"/>
+                <p14:modId xmlns:p14="http://schemas.microsoft.com/office/powerpoint/2010/main" val="837862604"/>
               </p:ext>
             </p:extLst>
           </p:nvPr>
@@ -8398,7 +8398,10 @@
                     <a:bodyPr/>
                     <a:lstStyle/>
                     <a:p>
-                      <a:endParaRPr lang="en-US" dirty="0"/>
+                      <a:r>
+                        <a:rPr lang="en-US" dirty="0"/>
+                        <a:t>UI Background, Font Search, BGM &amp; SFX, Main Menu animations</a:t>
+                      </a:r>
                     </a:p>
                   </a:txBody>
                   <a:tcPr/>

</xml_diff>

<commit_message>
Feedback & Approval Doc
Production outcome updated
</commit_message>
<xml_diff>
--- a/Documents/Weekly Production Logs/Fireball - Production Outcomes.pptx
+++ b/Documents/Weekly Production Logs/Fireball - Production Outcomes.pptx
@@ -8164,7 +8164,7 @@
             <p:ph idx="1"/>
             <p:extLst>
               <p:ext uri="{D42A27DB-BD31-4B8C-83A1-F6EECF244321}">
-                <p14:modId xmlns:p14="http://schemas.microsoft.com/office/powerpoint/2010/main" val="837862604"/>
+                <p14:modId xmlns:p14="http://schemas.microsoft.com/office/powerpoint/2010/main" val="3122643616"/>
               </p:ext>
             </p:extLst>
           </p:nvPr>
@@ -8331,6 +8331,10 @@
                     <a:bodyPr/>
                     <a:lstStyle/>
                     <a:p>
+                      <a:r>
+                        <a:rPr lang="en-US"/>
+                        <a:t>Playtesting</a:t>
+                      </a:r>
                       <a:endParaRPr lang="en-US" dirty="0"/>
                     </a:p>
                   </a:txBody>

</xml_diff>

<commit_message>
Update Fireball - Production Outcomes.pptx
</commit_message>
<xml_diff>
--- a/Documents/Weekly Production Logs/Fireball - Production Outcomes.pptx
+++ b/Documents/Weekly Production Logs/Fireball - Production Outcomes.pptx
@@ -212,7 +212,7 @@
           <a:p>
             <a:fld id="{24E03706-46C7-40D1-AB45-80A0B13C524D}" type="datetimeFigureOut">
               <a:rPr lang="en-US" smtClean="0"/>
-              <a:t>11/29/2018</a:t>
+              <a:t>11/30/2018</a:t>
             </a:fld>
             <a:endParaRPr lang="en-US"/>
           </a:p>
@@ -656,7 +656,7 @@
             <a:fld id="{5586B75A-687E-405C-8A0B-8D00578BA2C3}" type="datetimeFigureOut">
               <a:rPr lang="en-US" smtClean="0"/>
               <a:pPr/>
-              <a:t>11/29/2018</a:t>
+              <a:t>11/30/2018</a:t>
             </a:fld>
             <a:endParaRPr lang="en-US" dirty="0"/>
           </a:p>
@@ -828,7 +828,7 @@
             <a:fld id="{5586B75A-687E-405C-8A0B-8D00578BA2C3}" type="datetimeFigureOut">
               <a:rPr lang="en-US" smtClean="0"/>
               <a:pPr/>
-              <a:t>11/29/2018</a:t>
+              <a:t>11/30/2018</a:t>
             </a:fld>
             <a:endParaRPr lang="en-US" dirty="0"/>
           </a:p>
@@ -1053,7 +1053,7 @@
             <a:fld id="{5586B75A-687E-405C-8A0B-8D00578BA2C3}" type="datetimeFigureOut">
               <a:rPr lang="en-US" smtClean="0"/>
               <a:pPr/>
-              <a:t>11/29/2018</a:t>
+              <a:t>11/30/2018</a:t>
             </a:fld>
             <a:endParaRPr lang="en-US" dirty="0"/>
           </a:p>
@@ -1235,7 +1235,7 @@
             <a:fld id="{5586B75A-687E-405C-8A0B-8D00578BA2C3}" type="datetimeFigureOut">
               <a:rPr lang="en-US" smtClean="0"/>
               <a:pPr/>
-              <a:t>11/29/2018</a:t>
+              <a:t>11/30/2018</a:t>
             </a:fld>
             <a:endParaRPr lang="en-US" dirty="0"/>
           </a:p>
@@ -1543,7 +1543,7 @@
             <a:fld id="{5586B75A-687E-405C-8A0B-8D00578BA2C3}" type="datetimeFigureOut">
               <a:rPr lang="en-US" smtClean="0"/>
               <a:pPr/>
-              <a:t>11/29/2018</a:t>
+              <a:t>11/30/2018</a:t>
             </a:fld>
             <a:endParaRPr lang="en-US" dirty="0"/>
           </a:p>
@@ -1849,7 +1849,7 @@
             <a:fld id="{5586B75A-687E-405C-8A0B-8D00578BA2C3}" type="datetimeFigureOut">
               <a:rPr lang="en-US" smtClean="0"/>
               <a:pPr/>
-              <a:t>11/29/2018</a:t>
+              <a:t>11/30/2018</a:t>
             </a:fld>
             <a:endParaRPr lang="en-US" dirty="0"/>
           </a:p>
@@ -2273,7 +2273,7 @@
             <a:fld id="{5586B75A-687E-405C-8A0B-8D00578BA2C3}" type="datetimeFigureOut">
               <a:rPr lang="en-US" smtClean="0"/>
               <a:pPr/>
-              <a:t>11/29/2018</a:t>
+              <a:t>11/30/2018</a:t>
             </a:fld>
             <a:endParaRPr lang="en-US" dirty="0"/>
           </a:p>
@@ -2393,7 +2393,7 @@
             <a:fld id="{5586B75A-687E-405C-8A0B-8D00578BA2C3}" type="datetimeFigureOut">
               <a:rPr lang="en-US" smtClean="0"/>
               <a:pPr/>
-              <a:t>11/29/2018</a:t>
+              <a:t>11/30/2018</a:t>
             </a:fld>
             <a:endParaRPr lang="en-US" dirty="0"/>
           </a:p>
@@ -2490,7 +2490,7 @@
             <a:fld id="{5586B75A-687E-405C-8A0B-8D00578BA2C3}" type="datetimeFigureOut">
               <a:rPr lang="en-US" smtClean="0"/>
               <a:pPr/>
-              <a:t>11/29/2018</a:t>
+              <a:t>11/30/2018</a:t>
             </a:fld>
             <a:endParaRPr lang="en-US" dirty="0"/>
           </a:p>
@@ -2765,7 +2765,7 @@
             <a:fld id="{5586B75A-687E-405C-8A0B-8D00578BA2C3}" type="datetimeFigureOut">
               <a:rPr lang="en-US" smtClean="0"/>
               <a:pPr/>
-              <a:t>11/29/2018</a:t>
+              <a:t>11/30/2018</a:t>
             </a:fld>
             <a:endParaRPr lang="en-US" dirty="0"/>
           </a:p>
@@ -3032,7 +3032,7 @@
             <a:fld id="{5586B75A-687E-405C-8A0B-8D00578BA2C3}" type="datetimeFigureOut">
               <a:rPr lang="en-US" smtClean="0"/>
               <a:pPr/>
-              <a:t>11/29/2018</a:t>
+              <a:t>11/30/2018</a:t>
             </a:fld>
             <a:endParaRPr lang="en-US" dirty="0"/>
           </a:p>
@@ -3283,7 +3283,7 @@
             <a:fld id="{5586B75A-687E-405C-8A0B-8D00578BA2C3}" type="datetimeFigureOut">
               <a:rPr lang="en-US" smtClean="0"/>
               <a:pPr/>
-              <a:t>11/29/2018</a:t>
+              <a:t>11/30/2018</a:t>
             </a:fld>
             <a:endParaRPr lang="en-US" dirty="0"/>
           </a:p>
@@ -5203,7 +5203,7 @@
           <a:p>
             <a:r>
               <a:rPr lang="en-AU" b="1" dirty="0"/>
-              <a:t>Planned response to feedback for next milestone:</a:t>
+              <a:t>Planned response to feedback for next milestone: Implement clearer UI, refine animations, adjustments to powerups (most notably freeze powerup).</a:t>
             </a:r>
           </a:p>
         </p:txBody>
@@ -8504,13 +8504,7 @@
           <a:p>
             <a:r>
               <a:rPr lang="en-AU" b="1" dirty="0"/>
-              <a:t>Were all deliverables completed for the week?</a:t>
-            </a:r>
-          </a:p>
-          <a:p>
-            <a:r>
-              <a:rPr lang="en-AU" b="1" dirty="0"/>
-              <a:t>If not, how will the team compensate for this moving forward?</a:t>
+              <a:t>Were all deliverables completed for the week?	 	Yes</a:t>
             </a:r>
           </a:p>
         </p:txBody>

</xml_diff>

<commit_message>
Updated Production Outcomes document
</commit_message>
<xml_diff>
--- a/Documents/Weekly Production Logs/Fireball - Production Outcomes.pptx
+++ b/Documents/Weekly Production Logs/Fireball - Production Outcomes.pptx
@@ -4116,6 +4116,35 @@
           </a:p>
         </p:txBody>
       </p:sp>
+      <p:pic>
+        <p:nvPicPr>
+          <p:cNvPr id="5" name="Content Placeholder 5">
+            <a:extLst>
+              <a:ext uri="{FF2B5EF4-FFF2-40B4-BE49-F238E27FC236}">
+                <a16:creationId xmlns:a16="http://schemas.microsoft.com/office/drawing/2014/main" id="{043D742A-B0DA-498A-829B-AAB777240BD4}"/>
+              </a:ext>
+            </a:extLst>
+          </p:cNvPr>
+          <p:cNvPicPr>
+            <a:picLocks noGrp="1" noChangeAspect="1"/>
+          </p:cNvPicPr>
+          <p:nvPr>
+            <p:ph idx="1"/>
+          </p:nvPr>
+        </p:nvPicPr>
+        <p:blipFill>
+          <a:blip r:embed="rId2"/>
+          <a:stretch>
+            <a:fillRect/>
+          </a:stretch>
+        </p:blipFill>
+        <p:spPr>
+          <a:xfrm>
+            <a:off x="9641306" y="284176"/>
+            <a:ext cx="2332151" cy="1481969"/>
+          </a:xfrm>
+        </p:spPr>
+      </p:pic>
     </p:spTree>
     <p:extLst>
       <p:ext uri="{BB962C8B-B14F-4D97-AF65-F5344CB8AC3E}">
@@ -4680,6 +4709,36 @@
           </a:p>
         </p:txBody>
       </p:sp>
+      <p:pic>
+        <p:nvPicPr>
+          <p:cNvPr id="5" name="Content Placeholder 5">
+            <a:extLst>
+              <a:ext uri="{FF2B5EF4-FFF2-40B4-BE49-F238E27FC236}">
+                <a16:creationId xmlns:a16="http://schemas.microsoft.com/office/drawing/2014/main" id="{9D98D1C5-3EC6-447F-B54F-88BE4AA9B203}"/>
+              </a:ext>
+            </a:extLst>
+          </p:cNvPr>
+          <p:cNvPicPr>
+            <a:picLocks noChangeAspect="1"/>
+          </p:cNvPicPr>
+          <p:nvPr/>
+        </p:nvPicPr>
+        <p:blipFill>
+          <a:blip r:embed="rId2"/>
+          <a:stretch>
+            <a:fillRect/>
+          </a:stretch>
+        </p:blipFill>
+        <p:spPr>
+          <a:xfrm>
+            <a:off x="9641306" y="284176"/>
+            <a:ext cx="2332151" cy="1481969"/>
+          </a:xfrm>
+          <a:prstGeom prst="rect">
+            <a:avLst/>
+          </a:prstGeom>
+        </p:spPr>
+      </p:pic>
     </p:spTree>
     <p:extLst>
       <p:ext uri="{BB962C8B-B14F-4D97-AF65-F5344CB8AC3E}">
@@ -4826,6 +4885,35 @@
           </a:p>
         </p:txBody>
       </p:sp>
+      <p:pic>
+        <p:nvPicPr>
+          <p:cNvPr id="5" name="Content Placeholder 5">
+            <a:extLst>
+              <a:ext uri="{FF2B5EF4-FFF2-40B4-BE49-F238E27FC236}">
+                <a16:creationId xmlns:a16="http://schemas.microsoft.com/office/drawing/2014/main" id="{DCD74BA9-B397-4D94-816F-BD6BB5B0A24B}"/>
+              </a:ext>
+            </a:extLst>
+          </p:cNvPr>
+          <p:cNvPicPr>
+            <a:picLocks noGrp="1" noChangeAspect="1"/>
+          </p:cNvPicPr>
+          <p:nvPr>
+            <p:ph idx="1"/>
+          </p:nvPr>
+        </p:nvPicPr>
+        <p:blipFill>
+          <a:blip r:embed="rId2"/>
+          <a:stretch>
+            <a:fillRect/>
+          </a:stretch>
+        </p:blipFill>
+        <p:spPr>
+          <a:xfrm>
+            <a:off x="9641306" y="284176"/>
+            <a:ext cx="2332151" cy="1481969"/>
+          </a:xfrm>
+        </p:spPr>
+      </p:pic>
     </p:spTree>
     <p:extLst>
       <p:ext uri="{BB962C8B-B14F-4D97-AF65-F5344CB8AC3E}">
@@ -4899,14 +4987,14 @@
             <p:ph idx="1"/>
             <p:extLst>
               <p:ext uri="{D42A27DB-BD31-4B8C-83A1-F6EECF244321}">
-                <p14:modId xmlns:p14="http://schemas.microsoft.com/office/powerpoint/2010/main" val="1466408464"/>
+                <p14:modId xmlns:p14="http://schemas.microsoft.com/office/powerpoint/2010/main" val="2099787801"/>
               </p:ext>
             </p:extLst>
           </p:nvPr>
         </p:nvGraphicFramePr>
         <p:xfrm>
-          <a:off x="1202918" y="1506369"/>
-          <a:ext cx="9780588" cy="3845262"/>
+          <a:off x="1206409" y="1938996"/>
+          <a:ext cx="9780588" cy="3431391"/>
         </p:xfrm>
         <a:graphic>
           <a:graphicData uri="http://schemas.openxmlformats.org/drawingml/2006/table">
@@ -5123,13 +5211,8 @@
                     <a:p>
                       <a:r>
                         <a:rPr lang="en-US" dirty="0"/>
-                        <a:t>Powerups that changed playstyle were nice, powerups that simply added slightly on regular attack were </a:t>
-                      </a:r>
-                      <a:r>
-                        <a:rPr lang="en-US"/>
-                        <a:t>less interesting</a:t>
-                      </a:r>
-                      <a:endParaRPr lang="en-US" dirty="0"/>
+                        <a:t>Powerups that changed playstyle were nice, powerups that simply added slightly on regular attack were less interesting</a:t>
+                      </a:r>
                     </a:p>
                   </a:txBody>
                   <a:tcPr/>
@@ -5137,43 +5220,6 @@
                 <a:extLst>
                   <a:ext uri="{0D108BD9-81ED-4DB2-BD59-A6C34878D82A}">
                     <a16:rowId xmlns:a16="http://schemas.microsoft.com/office/drawing/2014/main" val="2995349064"/>
-                  </a:ext>
-                </a:extLst>
-              </a:tr>
-              <a:tr h="413871">
-                <a:tc>
-                  <a:txBody>
-                    <a:bodyPr/>
-                    <a:lstStyle/>
-                    <a:p>
-                      <a:endParaRPr lang="en-US" dirty="0"/>
-                    </a:p>
-                  </a:txBody>
-                  <a:tcPr/>
-                </a:tc>
-                <a:tc>
-                  <a:txBody>
-                    <a:bodyPr/>
-                    <a:lstStyle/>
-                    <a:p>
-                      <a:endParaRPr lang="en-US" dirty="0"/>
-                    </a:p>
-                  </a:txBody>
-                  <a:tcPr/>
-                </a:tc>
-                <a:tc>
-                  <a:txBody>
-                    <a:bodyPr/>
-                    <a:lstStyle/>
-                    <a:p>
-                      <a:endParaRPr lang="en-US" dirty="0"/>
-                    </a:p>
-                  </a:txBody>
-                  <a:tcPr/>
-                </a:tc>
-                <a:extLst>
-                  <a:ext uri="{0D108BD9-81ED-4DB2-BD59-A6C34878D82A}">
-                    <a16:rowId xmlns:a16="http://schemas.microsoft.com/office/drawing/2014/main" val="576643581"/>
                   </a:ext>
                 </a:extLst>
               </a:tr>
@@ -5208,6 +5254,36 @@
           </a:p>
         </p:txBody>
       </p:sp>
+      <p:pic>
+        <p:nvPicPr>
+          <p:cNvPr id="5" name="Content Placeholder 5">
+            <a:extLst>
+              <a:ext uri="{FF2B5EF4-FFF2-40B4-BE49-F238E27FC236}">
+                <a16:creationId xmlns:a16="http://schemas.microsoft.com/office/drawing/2014/main" id="{A2E5591A-5BE3-4AF7-93B4-64627D01DAF9}"/>
+              </a:ext>
+            </a:extLst>
+          </p:cNvPr>
+          <p:cNvPicPr>
+            <a:picLocks noChangeAspect="1"/>
+          </p:cNvPicPr>
+          <p:nvPr/>
+        </p:nvPicPr>
+        <p:blipFill>
+          <a:blip r:embed="rId2"/>
+          <a:stretch>
+            <a:fillRect/>
+          </a:stretch>
+        </p:blipFill>
+        <p:spPr>
+          <a:xfrm>
+            <a:off x="9641306" y="284176"/>
+            <a:ext cx="2332151" cy="1481969"/>
+          </a:xfrm>
+          <a:prstGeom prst="rect">
+            <a:avLst/>
+          </a:prstGeom>
+        </p:spPr>
+      </p:pic>
     </p:spTree>
     <p:extLst>
       <p:ext uri="{BB962C8B-B14F-4D97-AF65-F5344CB8AC3E}">
@@ -5364,6 +5440,35 @@
           </a:p>
         </p:txBody>
       </p:sp>
+      <p:pic>
+        <p:nvPicPr>
+          <p:cNvPr id="5" name="Content Placeholder 5">
+            <a:extLst>
+              <a:ext uri="{FF2B5EF4-FFF2-40B4-BE49-F238E27FC236}">
+                <a16:creationId xmlns:a16="http://schemas.microsoft.com/office/drawing/2014/main" id="{539041B4-3701-4966-AD5C-7A2B65D46628}"/>
+              </a:ext>
+            </a:extLst>
+          </p:cNvPr>
+          <p:cNvPicPr>
+            <a:picLocks noGrp="1" noChangeAspect="1"/>
+          </p:cNvPicPr>
+          <p:nvPr>
+            <p:ph idx="1"/>
+          </p:nvPr>
+        </p:nvPicPr>
+        <p:blipFill>
+          <a:blip r:embed="rId2"/>
+          <a:stretch>
+            <a:fillRect/>
+          </a:stretch>
+        </p:blipFill>
+        <p:spPr>
+          <a:xfrm>
+            <a:off x="9641306" y="284176"/>
+            <a:ext cx="2332151" cy="1481969"/>
+          </a:xfrm>
+        </p:spPr>
+      </p:pic>
     </p:spTree>
     <p:extLst>
       <p:ext uri="{BB962C8B-B14F-4D97-AF65-F5344CB8AC3E}">
@@ -5735,6 +5840,36 @@
           </a:p>
         </p:txBody>
       </p:sp>
+      <p:pic>
+        <p:nvPicPr>
+          <p:cNvPr id="5" name="Content Placeholder 5">
+            <a:extLst>
+              <a:ext uri="{FF2B5EF4-FFF2-40B4-BE49-F238E27FC236}">
+                <a16:creationId xmlns:a16="http://schemas.microsoft.com/office/drawing/2014/main" id="{143752AB-181D-46A7-A463-DD6D4E48B64B}"/>
+              </a:ext>
+            </a:extLst>
+          </p:cNvPr>
+          <p:cNvPicPr>
+            <a:picLocks noChangeAspect="1"/>
+          </p:cNvPicPr>
+          <p:nvPr/>
+        </p:nvPicPr>
+        <p:blipFill>
+          <a:blip r:embed="rId2"/>
+          <a:stretch>
+            <a:fillRect/>
+          </a:stretch>
+        </p:blipFill>
+        <p:spPr>
+          <a:xfrm>
+            <a:off x="9641306" y="284176"/>
+            <a:ext cx="2332151" cy="1481969"/>
+          </a:xfrm>
+          <a:prstGeom prst="rect">
+            <a:avLst/>
+          </a:prstGeom>
+        </p:spPr>
+      </p:pic>
     </p:spTree>
     <p:extLst>
       <p:ext uri="{BB962C8B-B14F-4D97-AF65-F5344CB8AC3E}">
@@ -5822,7 +5957,7 @@
         </p:blipFill>
         <p:spPr>
           <a:xfrm>
-            <a:off x="9641306" y="284176"/>
+            <a:off x="9632917" y="284176"/>
             <a:ext cx="2332151" cy="1481969"/>
           </a:xfrm>
         </p:spPr>
@@ -6357,6 +6492,36 @@
           </a:p>
         </p:txBody>
       </p:sp>
+      <p:pic>
+        <p:nvPicPr>
+          <p:cNvPr id="5" name="Content Placeholder 5">
+            <a:extLst>
+              <a:ext uri="{FF2B5EF4-FFF2-40B4-BE49-F238E27FC236}">
+                <a16:creationId xmlns:a16="http://schemas.microsoft.com/office/drawing/2014/main" id="{84390C8C-8F04-4E84-B627-B6AA6D043D84}"/>
+              </a:ext>
+            </a:extLst>
+          </p:cNvPr>
+          <p:cNvPicPr>
+            <a:picLocks noChangeAspect="1"/>
+          </p:cNvPicPr>
+          <p:nvPr/>
+        </p:nvPicPr>
+        <p:blipFill>
+          <a:blip r:embed="rId2"/>
+          <a:stretch>
+            <a:fillRect/>
+          </a:stretch>
+        </p:blipFill>
+        <p:spPr>
+          <a:xfrm>
+            <a:off x="9641306" y="284176"/>
+            <a:ext cx="2332151" cy="1481969"/>
+          </a:xfrm>
+          <a:prstGeom prst="rect">
+            <a:avLst/>
+          </a:prstGeom>
+        </p:spPr>
+      </p:pic>
     </p:spTree>
     <p:extLst>
       <p:ext uri="{BB962C8B-B14F-4D97-AF65-F5344CB8AC3E}">
@@ -6823,6 +6988,36 @@
           </a:p>
         </p:txBody>
       </p:sp>
+      <p:pic>
+        <p:nvPicPr>
+          <p:cNvPr id="5" name="Content Placeholder 5">
+            <a:extLst>
+              <a:ext uri="{FF2B5EF4-FFF2-40B4-BE49-F238E27FC236}">
+                <a16:creationId xmlns:a16="http://schemas.microsoft.com/office/drawing/2014/main" id="{D0FCDFB7-FC18-4F20-9DA7-7A161FD869F7}"/>
+              </a:ext>
+            </a:extLst>
+          </p:cNvPr>
+          <p:cNvPicPr>
+            <a:picLocks noChangeAspect="1"/>
+          </p:cNvPicPr>
+          <p:nvPr/>
+        </p:nvPicPr>
+        <p:blipFill>
+          <a:blip r:embed="rId2"/>
+          <a:stretch>
+            <a:fillRect/>
+          </a:stretch>
+        </p:blipFill>
+        <p:spPr>
+          <a:xfrm>
+            <a:off x="9641306" y="284176"/>
+            <a:ext cx="2332151" cy="1481969"/>
+          </a:xfrm>
+          <a:prstGeom prst="rect">
+            <a:avLst/>
+          </a:prstGeom>
+        </p:spPr>
+      </p:pic>
     </p:spTree>
     <p:extLst>
       <p:ext uri="{BB962C8B-B14F-4D97-AF65-F5344CB8AC3E}">
@@ -7248,6 +7443,36 @@
           </a:p>
         </p:txBody>
       </p:sp>
+      <p:pic>
+        <p:nvPicPr>
+          <p:cNvPr id="5" name="Content Placeholder 5">
+            <a:extLst>
+              <a:ext uri="{FF2B5EF4-FFF2-40B4-BE49-F238E27FC236}">
+                <a16:creationId xmlns:a16="http://schemas.microsoft.com/office/drawing/2014/main" id="{6378FB08-77A4-4838-8B4E-E83FAAB711E0}"/>
+              </a:ext>
+            </a:extLst>
+          </p:cNvPr>
+          <p:cNvPicPr>
+            <a:picLocks noChangeAspect="1"/>
+          </p:cNvPicPr>
+          <p:nvPr/>
+        </p:nvPicPr>
+        <p:blipFill>
+          <a:blip r:embed="rId2"/>
+          <a:stretch>
+            <a:fillRect/>
+          </a:stretch>
+        </p:blipFill>
+        <p:spPr>
+          <a:xfrm>
+            <a:off x="9641306" y="284176"/>
+            <a:ext cx="2332151" cy="1481969"/>
+          </a:xfrm>
+          <a:prstGeom prst="rect">
+            <a:avLst/>
+          </a:prstGeom>
+        </p:spPr>
+      </p:pic>
     </p:spTree>
     <p:extLst>
       <p:ext uri="{BB962C8B-B14F-4D97-AF65-F5344CB8AC3E}">
@@ -7666,6 +7891,36 @@
           </a:p>
         </p:txBody>
       </p:sp>
+      <p:pic>
+        <p:nvPicPr>
+          <p:cNvPr id="5" name="Content Placeholder 5">
+            <a:extLst>
+              <a:ext uri="{FF2B5EF4-FFF2-40B4-BE49-F238E27FC236}">
+                <a16:creationId xmlns:a16="http://schemas.microsoft.com/office/drawing/2014/main" id="{5F5AA0B6-6B6B-49B4-B87F-84A78D81E4F6}"/>
+              </a:ext>
+            </a:extLst>
+          </p:cNvPr>
+          <p:cNvPicPr>
+            <a:picLocks noChangeAspect="1"/>
+          </p:cNvPicPr>
+          <p:nvPr/>
+        </p:nvPicPr>
+        <p:blipFill>
+          <a:blip r:embed="rId2"/>
+          <a:stretch>
+            <a:fillRect/>
+          </a:stretch>
+        </p:blipFill>
+        <p:spPr>
+          <a:xfrm>
+            <a:off x="9641306" y="284176"/>
+            <a:ext cx="2332151" cy="1481969"/>
+          </a:xfrm>
+          <a:prstGeom prst="rect">
+            <a:avLst/>
+          </a:prstGeom>
+        </p:spPr>
+      </p:pic>
     </p:spTree>
     <p:extLst>
       <p:ext uri="{BB962C8B-B14F-4D97-AF65-F5344CB8AC3E}">
@@ -8091,6 +8346,36 @@
           </a:p>
         </p:txBody>
       </p:sp>
+      <p:pic>
+        <p:nvPicPr>
+          <p:cNvPr id="5" name="Content Placeholder 5">
+            <a:extLst>
+              <a:ext uri="{FF2B5EF4-FFF2-40B4-BE49-F238E27FC236}">
+                <a16:creationId xmlns:a16="http://schemas.microsoft.com/office/drawing/2014/main" id="{4DF8BBF2-7B73-427C-BC17-D9B6B3D960A9}"/>
+              </a:ext>
+            </a:extLst>
+          </p:cNvPr>
+          <p:cNvPicPr>
+            <a:picLocks noChangeAspect="1"/>
+          </p:cNvPicPr>
+          <p:nvPr/>
+        </p:nvPicPr>
+        <p:blipFill>
+          <a:blip r:embed="rId2"/>
+          <a:stretch>
+            <a:fillRect/>
+          </a:stretch>
+        </p:blipFill>
+        <p:spPr>
+          <a:xfrm>
+            <a:off x="9641306" y="284176"/>
+            <a:ext cx="2332151" cy="1481969"/>
+          </a:xfrm>
+          <a:prstGeom prst="rect">
+            <a:avLst/>
+          </a:prstGeom>
+        </p:spPr>
+      </p:pic>
     </p:spTree>
     <p:extLst>
       <p:ext uri="{BB962C8B-B14F-4D97-AF65-F5344CB8AC3E}">
@@ -8509,6 +8794,36 @@
           </a:p>
         </p:txBody>
       </p:sp>
+      <p:pic>
+        <p:nvPicPr>
+          <p:cNvPr id="5" name="Content Placeholder 5">
+            <a:extLst>
+              <a:ext uri="{FF2B5EF4-FFF2-40B4-BE49-F238E27FC236}">
+                <a16:creationId xmlns:a16="http://schemas.microsoft.com/office/drawing/2014/main" id="{C1BE451F-40AB-4561-8849-1ACEA4425B27}"/>
+              </a:ext>
+            </a:extLst>
+          </p:cNvPr>
+          <p:cNvPicPr>
+            <a:picLocks noChangeAspect="1"/>
+          </p:cNvPicPr>
+          <p:nvPr/>
+        </p:nvPicPr>
+        <p:blipFill>
+          <a:blip r:embed="rId2"/>
+          <a:stretch>
+            <a:fillRect/>
+          </a:stretch>
+        </p:blipFill>
+        <p:spPr>
+          <a:xfrm>
+            <a:off x="9641306" y="284176"/>
+            <a:ext cx="2332151" cy="1481969"/>
+          </a:xfrm>
+          <a:prstGeom prst="rect">
+            <a:avLst/>
+          </a:prstGeom>
+        </p:spPr>
+      </p:pic>
     </p:spTree>
     <p:extLst>
       <p:ext uri="{BB962C8B-B14F-4D97-AF65-F5344CB8AC3E}">

</xml_diff>